<commit_message>
04-03.pptx - 14페이지 추가
</commit_message>
<xml_diff>
--- a/ppt/04-03.pptx
+++ b/ppt/04-03.pptx
@@ -3832,7 +3832,7 @@
       </p:grpSpPr>
       <p:pic>
         <p:nvPicPr>
-          <p:cNvPr id="2" name="그림 1"/>
+          <p:cNvPr id="3" name="그림 2"/>
           <p:cNvPicPr>
             <a:picLocks noChangeAspect="1"/>
           </p:cNvPicPr>
@@ -3846,8 +3846,8 @@
         </p:blipFill>
         <p:spPr>
           <a:xfrm>
-            <a:off x="1807864" y="2556572"/>
-            <a:ext cx="4648849" cy="1619476"/>
+            <a:off x="416242" y="1518291"/>
+            <a:ext cx="2667603" cy="2828857"/>
           </a:xfrm>
           <a:prstGeom prst="rect">
             <a:avLst/>
@@ -3856,7 +3856,7 @@
       </p:pic>
       <p:pic>
         <p:nvPicPr>
-          <p:cNvPr id="3" name="그림 2"/>
+          <p:cNvPr id="4" name="그림 3"/>
           <p:cNvPicPr>
             <a:picLocks noChangeAspect="1"/>
           </p:cNvPicPr>
@@ -3870,8 +3870,8 @@
         </p:blipFill>
         <p:spPr>
           <a:xfrm>
-            <a:off x="6853320" y="1173518"/>
-            <a:ext cx="3782201" cy="4010831"/>
+            <a:off x="4028163" y="992142"/>
+            <a:ext cx="3877216" cy="3629532"/>
           </a:xfrm>
           <a:prstGeom prst="rect">
             <a:avLst/>
@@ -3880,51 +3880,104 @@
       </p:pic>
       <p:sp>
         <p:nvSpPr>
-          <p:cNvPr id="5" name="직사각형 4"/>
-          <p:cNvSpPr/>
-          <p:nvPr/>
-        </p:nvSpPr>
-        <p:spPr>
-          <a:xfrm>
-            <a:off x="944381" y="1798820"/>
-            <a:ext cx="6071016" cy="3979888"/>
-          </a:xfrm>
-          <a:prstGeom prst="rect">
-            <a:avLst/>
-          </a:prstGeom>
-          <a:solidFill>
-            <a:srgbClr val="00B050"/>
-          </a:solidFill>
-        </p:spPr>
-        <p:style>
-          <a:lnRef idx="2">
-            <a:schemeClr val="accent1">
-              <a:shade val="50000"/>
-            </a:schemeClr>
-          </a:lnRef>
-          <a:fillRef idx="1">
-            <a:schemeClr val="accent1"/>
-          </a:fillRef>
-          <a:effectRef idx="0">
-            <a:schemeClr val="accent1"/>
-          </a:effectRef>
-          <a:fontRef idx="minor">
-            <a:schemeClr val="lt1"/>
-          </a:fontRef>
-        </p:style>
-        <p:txBody>
-          <a:bodyPr rtlCol="0" anchor="ctr"/>
-          <a:lstStyle/>
-          <a:p>
-            <a:pPr algn="ctr"/>
-            <a:r>
-              <a:rPr lang="ko-KR" altLang="en-US" smtClean="0"/>
-              <a:t>작업 중</a:t>
-            </a:r>
-            <a:endParaRPr lang="ko-KR" altLang="en-US"/>
-          </a:p>
-        </p:txBody>
-      </p:sp>
+          <p:cNvPr id="6" name="TextBox 5"/>
+          <p:cNvSpPr txBox="1"/>
+          <p:nvPr/>
+        </p:nvSpPr>
+        <p:spPr>
+          <a:xfrm>
+            <a:off x="434714" y="262328"/>
+            <a:ext cx="1872629" cy="369332"/>
+          </a:xfrm>
+          <a:prstGeom prst="rect">
+            <a:avLst/>
+          </a:prstGeom>
+          <a:noFill/>
+        </p:spPr>
+        <p:txBody>
+          <a:bodyPr wrap="none" rtlCol="0">
+            <a:spAutoFit/>
+          </a:bodyPr>
+          <a:lstStyle/>
+          <a:p>
+            <a:r>
+              <a:rPr lang="en-US" altLang="ko-KR" dirty="0"/>
+              <a:t>UI-SJN-04-008U</a:t>
+            </a:r>
+            <a:endParaRPr lang="ko-KR" altLang="en-US" dirty="0"/>
+          </a:p>
+        </p:txBody>
+      </p:sp>
+      <p:sp>
+        <p:nvSpPr>
+          <p:cNvPr id="7" name="TextBox 6"/>
+          <p:cNvSpPr txBox="1"/>
+          <p:nvPr/>
+        </p:nvSpPr>
+        <p:spPr>
+          <a:xfrm>
+            <a:off x="4140790" y="5062689"/>
+            <a:ext cx="3651962" cy="307777"/>
+          </a:xfrm>
+          <a:prstGeom prst="rect">
+            <a:avLst/>
+          </a:prstGeom>
+          <a:noFill/>
+        </p:spPr>
+        <p:txBody>
+          <a:bodyPr wrap="none" rtlCol="0">
+            <a:spAutoFit/>
+          </a:bodyPr>
+          <a:lstStyle/>
+          <a:p>
+            <a:r>
+              <a:rPr lang="en-US" altLang="ko-KR" sz="1400" dirty="0" smtClean="0"/>
+              <a:t>css </a:t>
+            </a:r>
+            <a:r>
+              <a:rPr lang="ko-KR" altLang="en-US" sz="1400" dirty="0" smtClean="0"/>
+              <a:t>로는 </a:t>
+            </a:r>
+            <a:r>
+              <a:rPr lang="ko-KR" altLang="en-US" sz="1400" dirty="0" err="1" smtClean="0"/>
+              <a:t>안돼고</a:t>
+            </a:r>
+            <a:r>
+              <a:rPr lang="ko-KR" altLang="en-US" sz="1400" dirty="0" smtClean="0"/>
+              <a:t> 클래스를 넣어야 하겠네요</a:t>
+            </a:r>
+            <a:r>
+              <a:rPr lang="en-US" altLang="ko-KR" sz="1400" dirty="0" smtClean="0"/>
+              <a:t>.</a:t>
+            </a:r>
+            <a:endParaRPr lang="ko-KR" altLang="en-US" sz="1400" dirty="0"/>
+          </a:p>
+        </p:txBody>
+      </p:sp>
+      <p:pic>
+        <p:nvPicPr>
+          <p:cNvPr id="8" name="그림 7"/>
+          <p:cNvPicPr>
+            <a:picLocks noChangeAspect="1"/>
+          </p:cNvPicPr>
+          <p:nvPr/>
+        </p:nvPicPr>
+        <p:blipFill>
+          <a:blip r:embed="rId4"/>
+          <a:stretch>
+            <a:fillRect/>
+          </a:stretch>
+        </p:blipFill>
+        <p:spPr>
+          <a:xfrm>
+            <a:off x="8118025" y="1151860"/>
+            <a:ext cx="3880655" cy="4064718"/>
+          </a:xfrm>
+          <a:prstGeom prst="rect">
+            <a:avLst/>
+          </a:prstGeom>
+        </p:spPr>
+      </p:pic>
     </p:spTree>
     <p:extLst>
       <p:ext uri="{BB962C8B-B14F-4D97-AF65-F5344CB8AC3E}">

</xml_diff>